<commit_message>
update ppt presentation in spanish
</commit_message>
<xml_diff>
--- a/documents/spanish/Proyecto BPM Flow.pptx
+++ b/documents/spanish/Proyecto BPM Flow.pptx
@@ -7786,7 +7786,12 @@
             <p:ph idx="1"/>
           </p:nvPr>
         </p:nvSpPr>
-        <p:spPr/>
+        <p:spPr>
+          <a:xfrm>
+            <a:off x="2589212" y="1498600"/>
+            <a:ext cx="8915400" cy="4412622"/>
+          </a:xfrm>
+        </p:spPr>
         <p:txBody>
           <a:bodyPr/>
           <a:lstStyle/>
@@ -7900,11 +7905,7 @@
           <a:p>
             <a:r>
               <a:rPr lang="es-UY" dirty="0" smtClean="0"/>
-              <a:t>Proyecto y </a:t>
-            </a:r>
-            <a:r>
-              <a:rPr lang="es-UY" dirty="0" smtClean="0"/>
-              <a:t>Sub proyectos</a:t>
+              <a:t>Proyecto y Sub proyectos</a:t>
             </a:r>
             <a:endParaRPr lang="es-UY" dirty="0"/>
           </a:p>
@@ -7981,6 +7982,62 @@
               <a:rPr lang="en-US" dirty="0" smtClean="0"/>
               <a:t>®</a:t>
             </a:r>
+          </a:p>
+          <a:p>
+            <a:pPr lvl="1"/>
+            <a:r>
+              <a:rPr lang="en-US" dirty="0" err="1" smtClean="0"/>
+              <a:t>Iniciado</a:t>
+            </a:r>
+            <a:r>
+              <a:rPr lang="en-US" dirty="0" smtClean="0"/>
+              <a:t> </a:t>
+            </a:r>
+            <a:r>
+              <a:rPr lang="en-US" dirty="0" err="1" smtClean="0"/>
+              <a:t>en</a:t>
+            </a:r>
+            <a:r>
+              <a:rPr lang="en-US" dirty="0"/>
+              <a:t> 2014 </a:t>
+            </a:r>
+            <a:r>
+              <a:rPr lang="en-US" dirty="0" smtClean="0"/>
+              <a:t>– Squeak Source (</a:t>
+            </a:r>
+            <a:r>
+              <a:rPr lang="en-US" dirty="0" smtClean="0">
+                <a:hlinkClick r:id="rId2"/>
+              </a:rPr>
+              <a:t>http</a:t>
+            </a:r>
+            <a:r>
+              <a:rPr lang="en-US" dirty="0">
+                <a:hlinkClick r:id="rId2"/>
+              </a:rPr>
+              <a:t>://</a:t>
+            </a:r>
+            <a:r>
+              <a:rPr lang="en-US" dirty="0" smtClean="0">
+                <a:hlinkClick r:id="rId2"/>
+              </a:rPr>
+              <a:t>ss3.gemtalksystems.com</a:t>
+            </a:r>
+            <a:r>
+              <a:rPr lang="en-US" dirty="0" smtClean="0"/>
+              <a:t>)</a:t>
+            </a:r>
+          </a:p>
+          <a:p>
+            <a:pPr lvl="1"/>
+            <a:r>
+              <a:rPr lang="es-UY" dirty="0" smtClean="0"/>
+              <a:t>Migrado en 2016 a </a:t>
+            </a:r>
+            <a:r>
+              <a:rPr lang="es-UY" dirty="0" err="1" smtClean="0"/>
+              <a:t>Github</a:t>
+            </a:r>
             <a:endParaRPr lang="es-UY" dirty="0" smtClean="0"/>
           </a:p>
           <a:p>
@@ -8028,7 +8085,6 @@
               <a:rPr lang="es-UY" dirty="0" smtClean="0"/>
               <a:t>/S</a:t>
             </a:r>
-            <a:endParaRPr lang="es-UY" dirty="0" smtClean="0"/>
           </a:p>
           <a:p>
             <a:r>
@@ -8082,7 +8138,6 @@
               <a:rPr lang="es-UY" dirty="0" smtClean="0"/>
               <a:t> Administración y monitoreo Web Servers y otros procesos</a:t>
             </a:r>
-            <a:endParaRPr lang="es-UY" dirty="0" smtClean="0"/>
           </a:p>
           <a:p>
             <a:endParaRPr lang="es-UY" dirty="0"/>
@@ -8207,14 +8262,26 @@
             </a:r>
             <a:r>
               <a:rPr lang="es-UY" dirty="0" smtClean="0"/>
-              <a:t> de Grafos (o base activa de objetos)</a:t>
+              <a:t> </a:t>
+            </a:r>
+            <a:r>
+              <a:rPr lang="es-UY" dirty="0" smtClean="0"/>
+              <a:t>de </a:t>
+            </a:r>
+            <a:r>
+              <a:rPr lang="es-UY" dirty="0" smtClean="0"/>
+              <a:t>Grafos (o base activa de objetos)</a:t>
             </a:r>
           </a:p>
           <a:p>
             <a:pPr lvl="1"/>
             <a:r>
+              <a:rPr lang="es-UY" b="1" dirty="0" smtClean="0"/>
+              <a:t>64 bits </a:t>
+            </a:r>
+            <a:r>
               <a:rPr lang="es-UY" dirty="0" smtClean="0"/>
-              <a:t>64 bits – Linux/Solaris/AIX/Darwin(MAC) </a:t>
+              <a:t>– Linux/Solaris/AIX/Darwin(MAC) </a:t>
             </a:r>
           </a:p>
           <a:p>
@@ -8246,47 +8313,12 @@
           </a:p>
           <a:p>
             <a:r>
-              <a:rPr lang="en-US" dirty="0" err="1"/>
-              <a:t>GemStone</a:t>
-            </a:r>
-            <a:r>
-              <a:rPr lang="en-US" dirty="0"/>
-              <a:t>/S </a:t>
-            </a:r>
-            <a:r>
-              <a:rPr lang="en-US" dirty="0" err="1"/>
-              <a:t>esta</a:t>
-            </a:r>
-            <a:r>
-              <a:rPr lang="en-US" dirty="0"/>
-              <a:t> </a:t>
-            </a:r>
-            <a:r>
-              <a:rPr lang="en-US" dirty="0" err="1"/>
-              <a:t>basado</a:t>
-            </a:r>
-            <a:r>
-              <a:rPr lang="en-US" dirty="0"/>
-              <a:t> </a:t>
-            </a:r>
-            <a:r>
-              <a:rPr lang="en-US" dirty="0" err="1"/>
-              <a:t>en</a:t>
-            </a:r>
-            <a:r>
-              <a:rPr lang="en-US" dirty="0"/>
-              <a:t> </a:t>
-            </a:r>
-            <a:r>
-              <a:rPr lang="en-US" dirty="0" smtClean="0"/>
-              <a:t>Smalltalk</a:t>
-            </a:r>
-            <a:endParaRPr lang="es-UY" dirty="0" smtClean="0"/>
-          </a:p>
-          <a:p>
-            <a:r>
               <a:rPr lang="es-UY" dirty="0" smtClean="0"/>
-              <a:t>Primera versión 1986 </a:t>
+              <a:t>Primera </a:t>
+            </a:r>
+            <a:r>
+              <a:rPr lang="es-UY" dirty="0" smtClean="0"/>
+              <a:t>versión 1986 </a:t>
             </a:r>
           </a:p>
           <a:p>
@@ -8334,6 +8366,39 @@
             <a:endParaRPr lang="en-US" dirty="0" smtClean="0"/>
           </a:p>
           <a:p>
+            <a:r>
+              <a:rPr lang="en-US" dirty="0" err="1" smtClean="0"/>
+              <a:t>Código</a:t>
+            </a:r>
+            <a:r>
+              <a:rPr lang="en-US" dirty="0" smtClean="0"/>
+              <a:t> </a:t>
+            </a:r>
+            <a:r>
+              <a:rPr lang="en-US" dirty="0" err="1" smtClean="0"/>
+              <a:t>transaccional</a:t>
+            </a:r>
+            <a:endParaRPr lang="en-US" dirty="0" smtClean="0"/>
+          </a:p>
+          <a:p>
+            <a:r>
+              <a:rPr lang="en-US" sz="1600" dirty="0">
+                <a:hlinkClick r:id="rId3"/>
+              </a:rPr>
+              <a:t>https://gemtalksystems.com/about/customers</a:t>
+            </a:r>
+            <a:r>
+              <a:rPr lang="en-US" sz="1600" dirty="0" smtClean="0">
+                <a:hlinkClick r:id="rId3"/>
+              </a:rPr>
+              <a:t>/</a:t>
+            </a:r>
+            <a:endParaRPr lang="en-US" sz="1600" dirty="0" smtClean="0"/>
+          </a:p>
+          <a:p>
+            <a:pPr marL="0" indent="0">
+              <a:buNone/>
+            </a:pPr>
             <a:endParaRPr lang="es-UY" dirty="0"/>
           </a:p>
         </p:txBody>
@@ -8347,7 +8412,7 @@
           <p:nvPr/>
         </p:nvPicPr>
         <p:blipFill>
-          <a:blip r:embed="rId3">
+          <a:blip r:embed="rId4">
             <a:extLst>
               <a:ext uri="{28A0092B-C50C-407E-A947-70E740481C1C}">
                 <a14:useLocalDpi xmlns:a14="http://schemas.microsoft.com/office/drawing/2010/main" val="0"/>
@@ -8377,7 +8442,7 @@
           <p:nvPr/>
         </p:nvPicPr>
         <p:blipFill>
-          <a:blip r:embed="rId4">
+          <a:blip r:embed="rId5">
             <a:extLst>
               <a:ext uri="{28A0092B-C50C-407E-A947-70E740481C1C}">
                 <a14:useLocalDpi xmlns:a14="http://schemas.microsoft.com/office/drawing/2010/main" val="0"/>
@@ -8656,8 +8721,25 @@
             </a:r>
             <a:r>
               <a:rPr lang="es-UY" dirty="0"/>
-              <a:t> (https://www.orbeon.com/)</a:t>
-            </a:r>
+              <a:t> (</a:t>
+            </a:r>
+            <a:r>
+              <a:rPr lang="es-UY" dirty="0">
+                <a:hlinkClick r:id="rId2"/>
+              </a:rPr>
+              <a:t>https://www.orbeon.com</a:t>
+            </a:r>
+            <a:r>
+              <a:rPr lang="es-UY" dirty="0" smtClean="0">
+                <a:hlinkClick r:id="rId2"/>
+              </a:rPr>
+              <a:t>/</a:t>
+            </a:r>
+            <a:r>
+              <a:rPr lang="es-UY" dirty="0" smtClean="0"/>
+              <a:t>)</a:t>
+            </a:r>
+            <a:endParaRPr lang="es-UY" dirty="0"/>
           </a:p>
           <a:p>
             <a:r>
@@ -8741,7 +8823,7 @@
           <p:nvPr/>
         </p:nvPicPr>
         <p:blipFill>
-          <a:blip r:embed="rId2">
+          <a:blip r:embed="rId3">
             <a:extLst>
               <a:ext uri="{28A0092B-C50C-407E-A947-70E740481C1C}">
                 <a14:useLocalDpi xmlns:a14="http://schemas.microsoft.com/office/drawing/2010/main" val="0"/>
@@ -8771,7 +8853,7 @@
           <p:nvPr/>
         </p:nvPicPr>
         <p:blipFill>
-          <a:blip r:embed="rId3">
+          <a:blip r:embed="rId4">
             <a:extLst>
               <a:ext uri="{28A0092B-C50C-407E-A947-70E740481C1C}">
                 <a14:useLocalDpi xmlns:a14="http://schemas.microsoft.com/office/drawing/2010/main" val="0"/>
@@ -8801,7 +8883,7 @@
           <p:nvPr/>
         </p:nvPicPr>
         <p:blipFill>
-          <a:blip r:embed="rId4">
+          <a:blip r:embed="rId5">
             <a:extLst>
               <a:ext uri="{28A0092B-C50C-407E-A947-70E740481C1C}">
                 <a14:useLocalDpi xmlns:a14="http://schemas.microsoft.com/office/drawing/2010/main" val="0"/>
@@ -9253,9 +9335,18 @@
           <a:p>
             <a:pPr lvl="1"/>
             <a:r>
-              <a:rPr lang="es-UY" dirty="0"/>
-              <a:t>https://github.com/brunobuzzi/JadeForBPM</a:t>
-            </a:r>
+              <a:rPr lang="es-UY" dirty="0">
+                <a:hlinkClick r:id="rId4"/>
+              </a:rPr>
+              <a:t>https://</a:t>
+            </a:r>
+            <a:r>
+              <a:rPr lang="es-UY" dirty="0" smtClean="0">
+                <a:hlinkClick r:id="rId4"/>
+              </a:rPr>
+              <a:t>github.com/brunobuzzi/JadeForBPM</a:t>
+            </a:r>
+            <a:endParaRPr lang="es-UY" dirty="0"/>
           </a:p>
           <a:p>
             <a:pPr lvl="1"/>
@@ -9280,13 +9371,12 @@
             <a:pPr lvl="2"/>
             <a:r>
               <a:rPr lang="es-UY" dirty="0"/>
-              <a:t>Cerca de 700</a:t>
-            </a:r>
-          </a:p>
-          <a:p>
-            <a:pPr marL="0" indent="0">
-              <a:buNone/>
-            </a:pPr>
+              <a:t>Cerca de </a:t>
+            </a:r>
+            <a:r>
+              <a:rPr lang="es-UY" dirty="0" smtClean="0"/>
+              <a:t>700</a:t>
+            </a:r>
             <a:endParaRPr lang="es-UY" dirty="0" smtClean="0"/>
           </a:p>
           <a:p>
@@ -9451,7 +9541,7 @@
         <p:spPr>
           <a:xfrm>
             <a:off x="2589212" y="1511300"/>
-            <a:ext cx="8915400" cy="4399922"/>
+            <a:ext cx="8915400" cy="4927600"/>
           </a:xfrm>
         </p:spPr>
         <p:txBody>
@@ -9498,11 +9588,18 @@
           <a:p>
             <a:pPr lvl="1"/>
             <a:r>
-              <a:rPr lang="es-UY" dirty="0" err="1"/>
+              <a:rPr lang="es-UY" dirty="0" smtClean="0"/>
+              <a:t>Creación y ejecución de procesos BPMN</a:t>
+            </a:r>
+          </a:p>
+          <a:p>
+            <a:pPr lvl="1"/>
+            <a:r>
+              <a:rPr lang="es-UY" dirty="0" err="1" smtClean="0"/>
               <a:t>Multi</a:t>
             </a:r>
             <a:r>
-              <a:rPr lang="es-UY" dirty="0"/>
+              <a:rPr lang="es-UY" dirty="0" smtClean="0"/>
               <a:t> </a:t>
             </a:r>
             <a:r>

</xml_diff>